<commit_message>
revise oneshot function to generate sub-ideas based on the images
</commit_message>
<xml_diff>
--- a/my_ppts/attention_mode1.pptx
+++ b/my_ppts/attention_mode1.pptx
@@ -15,6 +15,9 @@
     <p:sldId id="263" r:id="rId14"/>
     <p:sldId id="264" r:id="rId15"/>
     <p:sldId id="265" r:id="rId16"/>
+    <p:sldId id="266" r:id="rId17"/>
+    <p:sldId id="267" r:id="rId18"/>
+    <p:sldId id="268" r:id="rId19"/>
   </p:sldIdLst>
   <p:sldSz cx="9144000" cy="5144400" type="screen4x3"/>
   <p:notesSz cx="6858000" cy="9144000"/>
@@ -3152,7 +3155,7 @@
               </a:defRPr>
             </a:pPr>
             <a:r>
-              <a:t>"Introducing the Transformer: Advancing Machine Translation with Attention Mechanisms"</a:t>
+              <a:t>Title: "Revolutionizing Machine Translation: The Transformer's Self-Attention Architecture"</a:t>
             </a:r>
           </a:p>
         </p:txBody>
@@ -3166,6 +3169,117 @@
 </file>
 
 <file path=ppt/slides/slide10.xml><?xml version="1.0" encoding="utf-8"?>
+<p:sld xmlns:a="http://schemas.openxmlformats.org/drawingml/2006/main" xmlns:p="http://schemas.openxmlformats.org/presentationml/2006/main" xmlns:r="http://schemas.openxmlformats.org/officeDocument/2006/relationships">
+  <p:cSld>
+    <p:spTree>
+      <p:nvGrpSpPr>
+        <p:cNvPr id="1" name=""/>
+        <p:cNvGrpSpPr/>
+        <p:nvPr/>
+      </p:nvGrpSpPr>
+      <p:grpSpPr/>
+      <p:pic>
+        <p:nvPicPr>
+          <p:cNvPr id="2" name="Picture 1" descr="bg3.png"/>
+          <p:cNvPicPr>
+            <a:picLocks noChangeAspect="1"/>
+          </p:cNvPicPr>
+          <p:nvPr/>
+        </p:nvPicPr>
+        <p:blipFill>
+          <a:blip r:embed="rId2"/>
+          <a:stretch>
+            <a:fillRect/>
+          </a:stretch>
+        </p:blipFill>
+        <p:spPr>
+          <a:xfrm>
+            <a:off x="0" y="0"/>
+            <a:ext cx="9144000" cy="5144400"/>
+          </a:xfrm>
+          <a:prstGeom prst="rect">
+            <a:avLst/>
+          </a:prstGeom>
+        </p:spPr>
+      </p:pic>
+      <p:sp>
+        <p:nvSpPr>
+          <p:cNvPr id="3" name="TextBox 2"/>
+          <p:cNvSpPr txBox="1"/>
+          <p:nvPr/>
+        </p:nvSpPr>
+        <p:spPr>
+          <a:xfrm>
+            <a:off x="968400" y="550800"/>
+            <a:ext cx="6958799" cy="399600"/>
+          </a:xfrm>
+          <a:prstGeom prst="rect">
+            <a:avLst/>
+          </a:prstGeom>
+          <a:noFill/>
+        </p:spPr>
+        <p:txBody>
+          <a:bodyPr wrap="none" anchor="t">
+            <a:spAutoFit/>
+          </a:bodyPr>
+          <a:lstStyle/>
+          <a:p>
+            <a:pPr>
+              <a:defRPr b="1" sz="2000">
+                <a:solidFill>
+                  <a:srgbClr val="000000"/>
+                </a:solidFill>
+                <a:latin typeface="Calibri"/>
+              </a:defRPr>
+            </a:pPr>
+          </a:p>
+        </p:txBody>
+      </p:sp>
+      <p:sp>
+        <p:nvSpPr>
+          <p:cNvPr id="4" name="TextBox 3"/>
+          <p:cNvSpPr txBox="1"/>
+          <p:nvPr/>
+        </p:nvSpPr>
+        <p:spPr>
+          <a:xfrm>
+            <a:off x="4208400" y="1353600"/>
+            <a:ext cx="4287600" cy="3056400"/>
+          </a:xfrm>
+          <a:prstGeom prst="rect">
+            <a:avLst/>
+          </a:prstGeom>
+          <a:noFill/>
+        </p:spPr>
+        <p:txBody>
+          <a:bodyPr wrap="square" anchor="t">
+            <a:spAutoFit/>
+          </a:bodyPr>
+          <a:lstStyle/>
+          <a:p>
+            <a:pPr>
+              <a:defRPr sz="1200">
+                <a:solidFill>
+                  <a:srgbClr val="000000"/>
+                </a:solidFill>
+                <a:latin typeface="Calibri"/>
+              </a:defRPr>
+            </a:pPr>
+            <a:r>
+              <a:t>- **Multi-Head Attention**: This feature of the Transformer allows for parallel processing of multiple attention layers, enhancing the model's ability to focus on various parts of the input sequence.</a:t>
+            </a:r>
+          </a:p>
+        </p:txBody>
+      </p:sp>
+    </p:spTree>
+  </p:cSld>
+  <p:clrMapOvr>
+    <a:masterClrMapping/>
+  </p:clrMapOvr>
+</p:sld>
+</file>
+
+<file path=ppt/slides/slide11.xml><?xml version="1.0" encoding="utf-8"?>
 <p:sld xmlns:a="http://schemas.openxmlformats.org/drawingml/2006/main" xmlns:p="http://schemas.openxmlformats.org/presentationml/2006/main" xmlns:r="http://schemas.openxmlformats.org/officeDocument/2006/relationships">
   <p:cSld>
     <p:spTree>
@@ -3229,9 +3343,6 @@
                 <a:latin typeface="Calibri"/>
               </a:defRPr>
             </a:pPr>
-            <a:r>
-              <a:t>Conclusion</a:t>
-            </a:r>
           </a:p>
         </p:txBody>
       </p:sp>
@@ -3266,17 +3377,247 @@
               </a:defRPr>
             </a:pPr>
             <a:r>
-              <a:t>- The Transformer redefines neural network paradigms, focusing on attention over recurrence and convolutions, enhancing machine translation and parsing efficiency.</a:t>
+              <a:t>- **Performance in Machine Translation**: The Transformer demonstrates superior efficiency and effectiveness in machine translation tasks, outperforming previous RNN and CNN-based models.</a:t>
+            </a:r>
+          </a:p>
+        </p:txBody>
+      </p:sp>
+    </p:spTree>
+  </p:cSld>
+  <p:clrMapOvr>
+    <a:masterClrMapping/>
+  </p:clrMapOvr>
+</p:sld>
+</file>
+
+<file path=ppt/slides/slide12.xml><?xml version="1.0" encoding="utf-8"?>
+<p:sld xmlns:a="http://schemas.openxmlformats.org/drawingml/2006/main" xmlns:p="http://schemas.openxmlformats.org/presentationml/2006/main" xmlns:r="http://schemas.openxmlformats.org/officeDocument/2006/relationships">
+  <p:cSld>
+    <p:spTree>
+      <p:nvGrpSpPr>
+        <p:cNvPr id="1" name=""/>
+        <p:cNvGrpSpPr/>
+        <p:nvPr/>
+      </p:nvGrpSpPr>
+      <p:grpSpPr/>
+      <p:pic>
+        <p:nvPicPr>
+          <p:cNvPr id="2" name="Picture 1" descr="bg2.png"/>
+          <p:cNvPicPr>
+            <a:picLocks noChangeAspect="1"/>
+          </p:cNvPicPr>
+          <p:nvPr/>
+        </p:nvPicPr>
+        <p:blipFill>
+          <a:blip r:embed="rId2"/>
+          <a:stretch>
+            <a:fillRect/>
+          </a:stretch>
+        </p:blipFill>
+        <p:spPr>
+          <a:xfrm>
+            <a:off x="0" y="0"/>
+            <a:ext cx="9144000" cy="5144400"/>
+          </a:xfrm>
+          <a:prstGeom prst="rect">
+            <a:avLst/>
+          </a:prstGeom>
+        </p:spPr>
+      </p:pic>
+      <p:sp>
+        <p:nvSpPr>
+          <p:cNvPr id="3" name="TextBox 2"/>
+          <p:cNvSpPr txBox="1"/>
+          <p:nvPr/>
+        </p:nvSpPr>
+        <p:spPr>
+          <a:xfrm>
+            <a:off x="968400" y="550800"/>
+            <a:ext cx="6958799" cy="399600"/>
+          </a:xfrm>
+          <a:prstGeom prst="rect">
+            <a:avLst/>
+          </a:prstGeom>
+          <a:noFill/>
+        </p:spPr>
+        <p:txBody>
+          <a:bodyPr wrap="none" anchor="t">
+            <a:spAutoFit/>
+          </a:bodyPr>
+          <a:lstStyle/>
+          <a:p>
+            <a:pPr>
+              <a:defRPr b="1" sz="2000">
+                <a:solidFill>
+                  <a:srgbClr val="000000"/>
+                </a:solidFill>
+                <a:latin typeface="Calibri"/>
+              </a:defRPr>
+            </a:pPr>
+            <a:r>
+              <a:t>Conclusion</a:t>
+            </a:r>
+          </a:p>
+        </p:txBody>
+      </p:sp>
+      <p:sp>
+        <p:nvSpPr>
+          <p:cNvPr id="4" name="TextBox 3"/>
+          <p:cNvSpPr txBox="1"/>
+          <p:nvPr/>
+        </p:nvSpPr>
+        <p:spPr>
+          <a:xfrm>
+            <a:off x="4208400" y="1353600"/>
+            <a:ext cx="4287600" cy="3056400"/>
+          </a:xfrm>
+          <a:prstGeom prst="rect">
+            <a:avLst/>
+          </a:prstGeom>
+          <a:noFill/>
+        </p:spPr>
+        <p:txBody>
+          <a:bodyPr wrap="square" anchor="t">
+            <a:spAutoFit/>
+          </a:bodyPr>
+          <a:lstStyle/>
+          <a:p>
+            <a:pPr>
+              <a:defRPr sz="1200">
+                <a:solidFill>
+                  <a:srgbClr val="000000"/>
+                </a:solidFill>
+                <a:latin typeface="Calibri"/>
+              </a:defRPr>
+            </a:pPr>
+            <a:r>
+              <a:t>In conclusion, the article encapsulates the transformative impact of the Transformer model on neural network architectures for machine translation:</a:t>
+            </a:r>
+          </a:p>
+        </p:txBody>
+      </p:sp>
+    </p:spTree>
+  </p:cSld>
+  <p:clrMapOvr>
+    <a:masterClrMapping/>
+  </p:clrMapOvr>
+</p:sld>
+</file>
+
+<file path=ppt/slides/slide13.xml><?xml version="1.0" encoding="utf-8"?>
+<p:sld xmlns:a="http://schemas.openxmlformats.org/drawingml/2006/main" xmlns:p="http://schemas.openxmlformats.org/presentationml/2006/main" xmlns:r="http://schemas.openxmlformats.org/officeDocument/2006/relationships">
+  <p:cSld>
+    <p:spTree>
+      <p:nvGrpSpPr>
+        <p:cNvPr id="1" name=""/>
+        <p:cNvGrpSpPr/>
+        <p:nvPr/>
+      </p:nvGrpSpPr>
+      <p:grpSpPr/>
+      <p:pic>
+        <p:nvPicPr>
+          <p:cNvPr id="2" name="Picture 1" descr="bg2.png"/>
+          <p:cNvPicPr>
+            <a:picLocks noChangeAspect="1"/>
+          </p:cNvPicPr>
+          <p:nvPr/>
+        </p:nvPicPr>
+        <p:blipFill>
+          <a:blip r:embed="rId2"/>
+          <a:stretch>
+            <a:fillRect/>
+          </a:stretch>
+        </p:blipFill>
+        <p:spPr>
+          <a:xfrm>
+            <a:off x="0" y="0"/>
+            <a:ext cx="9144000" cy="5144400"/>
+          </a:xfrm>
+          <a:prstGeom prst="rect">
+            <a:avLst/>
+          </a:prstGeom>
+        </p:spPr>
+      </p:pic>
+      <p:sp>
+        <p:nvSpPr>
+          <p:cNvPr id="3" name="TextBox 2"/>
+          <p:cNvSpPr txBox="1"/>
+          <p:nvPr/>
+        </p:nvSpPr>
+        <p:spPr>
+          <a:xfrm>
+            <a:off x="968400" y="550800"/>
+            <a:ext cx="6958799" cy="399600"/>
+          </a:xfrm>
+          <a:prstGeom prst="rect">
+            <a:avLst/>
+          </a:prstGeom>
+          <a:noFill/>
+        </p:spPr>
+        <p:txBody>
+          <a:bodyPr wrap="none" anchor="t">
+            <a:spAutoFit/>
+          </a:bodyPr>
+          <a:lstStyle/>
+          <a:p>
+            <a:pPr>
+              <a:defRPr b="1" sz="2000">
+                <a:solidFill>
+                  <a:srgbClr val="000000"/>
+                </a:solidFill>
+                <a:latin typeface="Calibri"/>
+              </a:defRPr>
+            </a:pPr>
+          </a:p>
+        </p:txBody>
+      </p:sp>
+      <p:sp>
+        <p:nvSpPr>
+          <p:cNvPr id="4" name="TextBox 3"/>
+          <p:cNvSpPr txBox="1"/>
+          <p:nvPr/>
+        </p:nvSpPr>
+        <p:spPr>
+          <a:xfrm>
+            <a:off x="4208400" y="1353600"/>
+            <a:ext cx="4287600" cy="3056400"/>
+          </a:xfrm>
+          <a:prstGeom prst="rect">
+            <a:avLst/>
+          </a:prstGeom>
+          <a:noFill/>
+        </p:spPr>
+        <p:txBody>
+          <a:bodyPr wrap="square" anchor="t">
+            <a:spAutoFit/>
+          </a:bodyPr>
+          <a:lstStyle/>
+          <a:p>
+            <a:pPr>
+              <a:defRPr sz="1200">
+                <a:solidFill>
+                  <a:srgbClr val="000000"/>
+                </a:solidFill>
+                <a:latin typeface="Calibri"/>
+              </a:defRPr>
+            </a:pPr>
+            <a:r>
+              <a:t>- Introduced the Transformer, a model eschewing recurrent and convolutional layers for self-attention.</a:t>
             </a:r>
             <a:br/>
             <a:br/>
             <a:r>
-              <a:t>- It achieves unprecedented BLEU scores, optimizes training time, and reduces computational demands, setting new industry standards.</a:t>
+              <a:t>- Detailed the Scaled Dot-Product Attention mechanism, central to the Transformer's interpretative power.</a:t>
             </a:r>
             <a:br/>
             <a:br/>
             <a:r>
-              <a:t>- Future applications may extend beyond text, leveraging its scalable, attention-based framework for diverse data modalities.</a:t>
+              <a:t>- Described Multi-Head Attention, enhancing parallel processing and contextual understanding.</a:t>
+            </a:r>
+            <a:br/>
+            <a:br/>
+            <a:r>
+              <a:t>- Highlighted the Transformer's superior performance and efficiency in machine translation tasks.</a:t>
             </a:r>
           </a:p>
         </p:txBody>
@@ -3301,7 +3642,7 @@
       <p:grpSpPr/>
       <p:pic>
         <p:nvPicPr>
-          <p:cNvPr id="2" name="Picture 1" descr="bg3.png"/>
+          <p:cNvPr id="2" name="Picture 1" descr="bg1.png"/>
           <p:cNvPicPr>
             <a:picLocks noChangeAspect="1"/>
           </p:cNvPicPr>
@@ -3395,32 +3736,22 @@
             <a:br/>
             <a:br/>
             <a:r>
-              <a:t>Introduction of the Transformer architecture.</a:t>
+              <a:t>Introduction of the Transformer Model Architecture.</a:t>
             </a:r>
             <a:br/>
             <a:br/>
             <a:r>
-              <a:t>Elimination of recurrence and convolutions.</a:t>
+              <a:t>Implementation of Scaled Dot-Product Attention Mechanism.</a:t>
             </a:r>
             <a:br/>
             <a:br/>
             <a:r>
-              <a:t>Utilization of attention mechanisms exclusively.</a:t>
+              <a:t>Integration of Multi-Head Attention for Parallel Processing.</a:t>
             </a:r>
             <a:br/>
             <a:br/>
             <a:r>
-              <a:t>Advantages in machine translation tasks.</a:t>
-            </a:r>
-            <a:br/>
-            <a:br/>
-            <a:r>
-              <a:t>Record-setting BLEU scores on benchmark datasets.</a:t>
-            </a:r>
-            <a:br/>
-            <a:br/>
-            <a:r>
-              <a:t>Reduced training time and computational resources.</a:t>
+              <a:t>Advancements in Machine Translation with the Transformer.</a:t>
             </a:r>
             <a:br/>
             <a:br/>
@@ -3450,7 +3781,7 @@
       <p:grpSpPr/>
       <p:pic>
         <p:nvPicPr>
-          <p:cNvPr id="2" name="Picture 1" descr="bg3.png"/>
+          <p:cNvPr id="2" name="Picture 1" descr="bg2.png"/>
           <p:cNvPicPr>
             <a:picLocks noChangeAspect="1"/>
           </p:cNvPicPr>
@@ -3539,22 +3870,7 @@
               </a:defRPr>
             </a:pPr>
             <a:r>
-              <a:t>- Unveiling the Transformer: A groundbreaking architecture revolutionizing neural networks by prioritizing attention mechanisms over traditional recurrence and convolutions.</a:t>
-            </a:r>
-            <a:br/>
-            <a:br/>
-            <a:r>
-              <a:t>- Demonstrates unmatched efficiency and performance in machine translation and parsing tasks, marking a significant leap in AI capabilities.</a:t>
-            </a:r>
-            <a:br/>
-            <a:br/>
-            <a:r>
-              <a:t>- Employs innovative self-attention techniques to process data in parallel, drastically cutting down training time and computational resources.</a:t>
-            </a:r>
-            <a:br/>
-            <a:br/>
-            <a:r>
-              <a:t>- Sets new benchmarks in machine learning, outperforming established models with its unique, attention-centric approach.</a:t>
+              <a:t>In the rapidly evolving field of neural network architectures, the Transformer stands out as a groundbreaking model that revolutionizes machine translation. Here's an overview of its core concepts:</a:t>
             </a:r>
           </a:p>
         </p:txBody>
@@ -3631,9 +3947,6 @@
                 <a:latin typeface="Calibri"/>
               </a:defRPr>
             </a:pPr>
-            <a:r>
-              <a:t>Introduction of the Transformer architecture.</a:t>
-            </a:r>
           </a:p>
         </p:txBody>
       </p:sp>
@@ -3668,55 +3981,26 @@
               </a:defRPr>
             </a:pPr>
             <a:r>
-              <a:t>- Transformer: A novel neural network by Google Brain.</a:t>
+              <a:t>- **The Transformer Model Architecture**: A pioneering approach that eschews traditional recurrent and convolutional layers in favor of a design powered entirely by self-attention mechanisms.</a:t>
             </a:r>
             <a:br/>
             <a:br/>
             <a:r>
-              <a:t>- Relies solely on attention mechanisms, no recurrence/convolutions.</a:t>
+              <a:t>- **Scaled Dot-Product Attention**: The crux of the Transformer, enabling dynamic weighting of input significance, which enhances the model's interpretative ability.</a:t>
             </a:r>
             <a:br/>
             <a:br/>
             <a:r>
-              <a:t>- Outperforms previous models in machine translation tasks.</a:t>
+              <a:t>- **Multi-Head Attention**: A novel structure that runs several attention mechanisms in parallel, refining the model's focus and improving its capacity to capture diverse contextual nuances.</a:t>
             </a:r>
             <a:br/>
             <a:br/>
             <a:r>
-              <a:t>- Achieves high BLEU scores, showcasing efficiency and quality.</a:t>
-            </a:r>
-            <a:br/>
-            <a:br/>
-            <a:r>
-              <a:t>- Successfully applied to English constituency parsing.</a:t>
-            </a:r>
-          </a:p>
-        </p:txBody>
-      </p:sp>
-      <p:pic>
-        <p:nvPicPr>
-          <p:cNvPr id="5" name="Picture 4" descr="Figure_1_0.png"/>
-          <p:cNvPicPr>
-            <a:picLocks noChangeAspect="1"/>
-          </p:cNvPicPr>
-          <p:nvPr/>
-        </p:nvPicPr>
-        <p:blipFill>
-          <a:blip r:embed="rId3"/>
-          <a:stretch>
-            <a:fillRect/>
-          </a:stretch>
-        </p:blipFill>
-        <p:spPr>
-          <a:xfrm>
-            <a:off x="644400" y="1353600"/>
-            <a:ext cx="3351600" cy="3038400"/>
-          </a:xfrm>
-          <a:prstGeom prst="rect">
-            <a:avLst/>
-          </a:prstGeom>
-        </p:spPr>
-      </p:pic>
+              <a:t>- **Performance and Efficiency**: The Transformer demonstrates superior translation quality, achieving state-of-the-art results with remarkable training efficiency, a testament to its advanced design.</a:t>
+            </a:r>
+          </a:p>
+        </p:txBody>
+      </p:sp>
     </p:spTree>
   </p:cSld>
   <p:clrMapOvr>
@@ -3726,140 +4010,6 @@
 </file>
 
 <file path=ppt/slides/slide5.xml><?xml version="1.0" encoding="utf-8"?>
-<p:sld xmlns:a="http://schemas.openxmlformats.org/drawingml/2006/main" xmlns:p="http://schemas.openxmlformats.org/presentationml/2006/main" xmlns:r="http://schemas.openxmlformats.org/officeDocument/2006/relationships">
-  <p:cSld>
-    <p:spTree>
-      <p:nvGrpSpPr>
-        <p:cNvPr id="1" name=""/>
-        <p:cNvGrpSpPr/>
-        <p:nvPr/>
-      </p:nvGrpSpPr>
-      <p:grpSpPr/>
-      <p:pic>
-        <p:nvPicPr>
-          <p:cNvPr id="2" name="Picture 1" descr="bg1.png"/>
-          <p:cNvPicPr>
-            <a:picLocks noChangeAspect="1"/>
-          </p:cNvPicPr>
-          <p:nvPr/>
-        </p:nvPicPr>
-        <p:blipFill>
-          <a:blip r:embed="rId2"/>
-          <a:stretch>
-            <a:fillRect/>
-          </a:stretch>
-        </p:blipFill>
-        <p:spPr>
-          <a:xfrm>
-            <a:off x="0" y="0"/>
-            <a:ext cx="9144000" cy="5144400"/>
-          </a:xfrm>
-          <a:prstGeom prst="rect">
-            <a:avLst/>
-          </a:prstGeom>
-        </p:spPr>
-      </p:pic>
-      <p:sp>
-        <p:nvSpPr>
-          <p:cNvPr id="3" name="TextBox 2"/>
-          <p:cNvSpPr txBox="1"/>
-          <p:nvPr/>
-        </p:nvSpPr>
-        <p:spPr>
-          <a:xfrm>
-            <a:off x="968400" y="550800"/>
-            <a:ext cx="6958799" cy="399600"/>
-          </a:xfrm>
-          <a:prstGeom prst="rect">
-            <a:avLst/>
-          </a:prstGeom>
-          <a:noFill/>
-        </p:spPr>
-        <p:txBody>
-          <a:bodyPr wrap="none" anchor="t">
-            <a:spAutoFit/>
-          </a:bodyPr>
-          <a:lstStyle/>
-          <a:p>
-            <a:pPr>
-              <a:defRPr b="1" sz="2000">
-                <a:solidFill>
-                  <a:srgbClr val="000000"/>
-                </a:solidFill>
-                <a:latin typeface="Calibri"/>
-              </a:defRPr>
-            </a:pPr>
-            <a:r>
-              <a:t>Elimination of recurrence and convolutions.</a:t>
-            </a:r>
-          </a:p>
-        </p:txBody>
-      </p:sp>
-      <p:sp>
-        <p:nvSpPr>
-          <p:cNvPr id="4" name="TextBox 3"/>
-          <p:cNvSpPr txBox="1"/>
-          <p:nvPr/>
-        </p:nvSpPr>
-        <p:spPr>
-          <a:xfrm>
-            <a:off x="4208400" y="1353600"/>
-            <a:ext cx="4287600" cy="3056400"/>
-          </a:xfrm>
-          <a:prstGeom prst="rect">
-            <a:avLst/>
-          </a:prstGeom>
-          <a:noFill/>
-        </p:spPr>
-        <p:txBody>
-          <a:bodyPr wrap="square" anchor="t">
-            <a:spAutoFit/>
-          </a:bodyPr>
-          <a:lstStyle/>
-          <a:p>
-            <a:pPr>
-              <a:defRPr sz="1200">
-                <a:solidFill>
-                  <a:srgbClr val="000000"/>
-                </a:solidFill>
-                <a:latin typeface="Calibri"/>
-              </a:defRPr>
-            </a:pPr>
-            <a:r>
-              <a:t>- Transformer architecture replaces recurrent/convolutional networks.</a:t>
-            </a:r>
-            <a:br/>
-            <a:br/>
-            <a:r>
-              <a:t>- Relies solely on attention mechanisms.</a:t>
-            </a:r>
-            <a:br/>
-            <a:br/>
-            <a:r>
-              <a:t>- Achieves superior machine translation results.</a:t>
-            </a:r>
-            <a:br/>
-            <a:br/>
-            <a:r>
-              <a:t>- More parallelizable, trains faster.</a:t>
-            </a:r>
-            <a:br/>
-            <a:br/>
-            <a:r>
-              <a:t>- Successfully applied to English constituency parsing.</a:t>
-            </a:r>
-          </a:p>
-        </p:txBody>
-      </p:sp>
-    </p:spTree>
-  </p:cSld>
-  <p:clrMapOvr>
-    <a:masterClrMapping/>
-  </p:clrMapOvr>
-</p:sld>
-</file>
-
-<file path=ppt/slides/slide6.xml><?xml version="1.0" encoding="utf-8"?>
 <p:sld xmlns:a="http://schemas.openxmlformats.org/drawingml/2006/main" xmlns:p="http://schemas.openxmlformats.org/presentationml/2006/main" xmlns:r="http://schemas.openxmlformats.org/officeDocument/2006/relationships">
   <p:cSld>
     <p:spTree>
@@ -3924,7 +4074,7 @@
               </a:defRPr>
             </a:pPr>
             <a:r>
-              <a:t>Utilization of attention mechanisms exclusively.</a:t>
+              <a:t>Introduction of the Transformer Model Architecture.</a:t>
             </a:r>
           </a:p>
         </p:txBody>
@@ -3960,34 +4110,182 @@
               </a:defRPr>
             </a:pPr>
             <a:r>
-              <a:t>- Transformer architecture uses only attention mechanisms, no RNNs/convolutions.</a:t>
+              <a:t>- **The Transformer Model Architecture**: A novel neural network design that eliminates recurrent layers in favor of self-attention mechanisms, optimizing machine translation tasks.</a:t>
             </a:r>
             <a:br/>
             <a:br/>
             <a:r>
-              <a:t>- Achieves constant operation count for input/output relations.</a:t>
+              <a:t>- **Scaled Dot-Product Attention**: A key component that computes attention scores, influencing the model's focus during sequence transduction.</a:t>
             </a:r>
             <a:br/>
             <a:br/>
             <a:r>
-              <a:t>- Multi-Head Attention improves resolution in this setup.</a:t>
+              <a:t>- **Multi-Head Attention**: Operates with parallel attention layers, each providing a unique perspective, enhancing the model's ability to learn from different positional contexts.</a:t>
             </a:r>
             <a:br/>
             <a:br/>
             <a:r>
-              <a:t>- Self-attention aids diverse tasks like reading comprehension and summarization.</a:t>
+              <a:t>- **Performance and Efficiency**: The Transformer demonstrates superior results in machine translation, outperforming previous architectures while maintaining efficiency.</a:t>
+            </a:r>
+          </a:p>
+        </p:txBody>
+      </p:sp>
+      <p:pic>
+        <p:nvPicPr>
+          <p:cNvPr id="5" name="Picture 4" descr="Figure_1_0.png"/>
+          <p:cNvPicPr>
+            <a:picLocks noChangeAspect="1"/>
+          </p:cNvPicPr>
+          <p:nvPr/>
+        </p:nvPicPr>
+        <p:blipFill>
+          <a:blip r:embed="rId3"/>
+          <a:stretch>
+            <a:fillRect/>
+          </a:stretch>
+        </p:blipFill>
+        <p:spPr>
+          <a:xfrm>
+            <a:off x="644400" y="1353600"/>
+            <a:ext cx="3351600" cy="3038400"/>
+          </a:xfrm>
+          <a:prstGeom prst="rect">
+            <a:avLst/>
+          </a:prstGeom>
+        </p:spPr>
+      </p:pic>
+    </p:spTree>
+  </p:cSld>
+  <p:clrMapOvr>
+    <a:masterClrMapping/>
+  </p:clrMapOvr>
+</p:sld>
+</file>
+
+<file path=ppt/slides/slide6.xml><?xml version="1.0" encoding="utf-8"?>
+<p:sld xmlns:a="http://schemas.openxmlformats.org/drawingml/2006/main" xmlns:p="http://schemas.openxmlformats.org/presentationml/2006/main" xmlns:r="http://schemas.openxmlformats.org/officeDocument/2006/relationships">
+  <p:cSld>
+    <p:spTree>
+      <p:nvGrpSpPr>
+        <p:cNvPr id="1" name=""/>
+        <p:cNvGrpSpPr/>
+        <p:nvPr/>
+      </p:nvGrpSpPr>
+      <p:grpSpPr/>
+      <p:pic>
+        <p:nvPicPr>
+          <p:cNvPr id="2" name="Picture 1" descr="bg2.png"/>
+          <p:cNvPicPr>
+            <a:picLocks noChangeAspect="1"/>
+          </p:cNvPicPr>
+          <p:nvPr/>
+        </p:nvPicPr>
+        <p:blipFill>
+          <a:blip r:embed="rId2"/>
+          <a:stretch>
+            <a:fillRect/>
+          </a:stretch>
+        </p:blipFill>
+        <p:spPr>
+          <a:xfrm>
+            <a:off x="0" y="0"/>
+            <a:ext cx="9144000" cy="5144400"/>
+          </a:xfrm>
+          <a:prstGeom prst="rect">
+            <a:avLst/>
+          </a:prstGeom>
+        </p:spPr>
+      </p:pic>
+      <p:sp>
+        <p:nvSpPr>
+          <p:cNvPr id="3" name="TextBox 2"/>
+          <p:cNvSpPr txBox="1"/>
+          <p:nvPr/>
+        </p:nvSpPr>
+        <p:spPr>
+          <a:xfrm>
+            <a:off x="968400" y="550800"/>
+            <a:ext cx="6958799" cy="399600"/>
+          </a:xfrm>
+          <a:prstGeom prst="rect">
+            <a:avLst/>
+          </a:prstGeom>
+          <a:noFill/>
+        </p:spPr>
+        <p:txBody>
+          <a:bodyPr wrap="none" anchor="t">
+            <a:spAutoFit/>
+          </a:bodyPr>
+          <a:lstStyle/>
+          <a:p>
+            <a:pPr>
+              <a:defRPr b="1" sz="2000">
+                <a:solidFill>
+                  <a:srgbClr val="000000"/>
+                </a:solidFill>
+                <a:latin typeface="Calibri"/>
+              </a:defRPr>
+            </a:pPr>
+            <a:r>
+              <a:t>Implementation of Scaled Dot-Product Attention Mechanism.</a:t>
+            </a:r>
+          </a:p>
+        </p:txBody>
+      </p:sp>
+      <p:sp>
+        <p:nvSpPr>
+          <p:cNvPr id="4" name="TextBox 3"/>
+          <p:cNvSpPr txBox="1"/>
+          <p:nvPr/>
+        </p:nvSpPr>
+        <p:spPr>
+          <a:xfrm>
+            <a:off x="4208400" y="1353600"/>
+            <a:ext cx="4287600" cy="3056400"/>
+          </a:xfrm>
+          <a:prstGeom prst="rect">
+            <a:avLst/>
+          </a:prstGeom>
+          <a:noFill/>
+        </p:spPr>
+        <p:txBody>
+          <a:bodyPr wrap="square" anchor="t">
+            <a:spAutoFit/>
+          </a:bodyPr>
+          <a:lstStyle/>
+          <a:p>
+            <a:pPr>
+              <a:defRPr sz="1200">
+                <a:solidFill>
+                  <a:srgbClr val="000000"/>
+                </a:solidFill>
+                <a:latin typeface="Calibri"/>
+              </a:defRPr>
+            </a:pPr>
+            <a:r>
+              <a:t>- **The Transformer Model Architecture**: A novel neural network design that eliminates recurrent layers in favor of self-attention mechanisms.</a:t>
             </a:r>
             <a:br/>
             <a:br/>
             <a:r>
-              <a:t>- Outperforms prior models in machine translation efficiency and quality.</a:t>
+              <a:t>- **Scaled Dot-Product Attention**: A key component of the Transformer, calculating attention as a weighted sum of values based on query-key compatibility.</a:t>
+            </a:r>
+            <a:br/>
+            <a:br/>
+            <a:r>
+              <a:t>- **Multi-Head Attention**: This feature runs several attention layers in parallel, enhancing the model's ability to focus on different positions.</a:t>
+            </a:r>
+            <a:br/>
+            <a:br/>
+            <a:r>
+              <a:t>- **Efficiency in Machine Translation**: The Transformer demonstrates superior performance in translation tasks, outperforming RNN-based models.</a:t>
             </a:r>
           </a:p>
         </p:txBody>
       </p:sp>
       <p:pic>
         <p:nvPicPr>
-          <p:cNvPr id="5" name="Picture 4" descr="Figure_2_1.png"/>
+          <p:cNvPr id="5" name="Picture 4" descr="Figure_2_0.png"/>
           <p:cNvPicPr>
             <a:picLocks noChangeAspect="1"/>
           </p:cNvPicPr>
@@ -4029,7 +4327,7 @@
       <p:grpSpPr/>
       <p:pic>
         <p:nvPicPr>
-          <p:cNvPr id="2" name="Picture 1" descr="bg3.png"/>
+          <p:cNvPr id="2" name="Picture 1" descr="bg2.png"/>
           <p:cNvPicPr>
             <a:picLocks noChangeAspect="1"/>
           </p:cNvPicPr>
@@ -4082,7 +4380,7 @@
               </a:defRPr>
             </a:pPr>
             <a:r>
-              <a:t>Advantages in machine translation tasks.</a:t>
+              <a:t>Integration of Multi-Head Attention for Parallel Processing.</a:t>
             </a:r>
           </a:p>
         </p:txBody>
@@ -4118,31 +4416,50 @@
               </a:defRPr>
             </a:pPr>
             <a:r>
-              <a:t>- Transformer architecture outperforms in machine translation.</a:t>
+              <a:t>- **The Transformer Model Architecture**: Innovatively structured, it computes input and output representations in parallel, leveraging self-attention for efficiency.</a:t>
             </a:r>
             <a:br/>
             <a:br/>
             <a:r>
-              <a:t>- Achieves 28.4 BLEU on English-to-German task.</a:t>
+              <a:t>- **Scaled Dot-Product Attention**: A key component, it scales attention with input size, optimizing the self-attention process for varying sequence lengths.</a:t>
             </a:r>
             <a:br/>
             <a:br/>
             <a:r>
-              <a:t>- Surpasses previous bests by over 2 BLEU points.</a:t>
+              <a:t>- **Multi-Head Attention**: This feature runs multiple attention layers concurrently, enhancing the model's ability to focus on different positions and represent complex dependencies.</a:t>
             </a:r>
             <a:br/>
             <a:br/>
             <a:r>
-              <a:t>- Sets record 41.8 BLEU on English-to-French task.</a:t>
-            </a:r>
-            <a:br/>
-            <a:br/>
-            <a:r>
-              <a:t>- Requires less training time on fewer GPUs.</a:t>
-            </a:r>
-          </a:p>
-        </p:txBody>
-      </p:sp>
+              <a:t>- **Performance in Machine Translation**: The Transformer demonstrates superior efficiency and effectiveness in translation tasks, outperforming RNN and CNN models.</a:t>
+            </a:r>
+          </a:p>
+        </p:txBody>
+      </p:sp>
+      <p:pic>
+        <p:nvPicPr>
+          <p:cNvPr id="5" name="Picture 4" descr="Figure_2_1.png"/>
+          <p:cNvPicPr>
+            <a:picLocks noChangeAspect="1"/>
+          </p:cNvPicPr>
+          <p:nvPr/>
+        </p:nvPicPr>
+        <p:blipFill>
+          <a:blip r:embed="rId3"/>
+          <a:stretch>
+            <a:fillRect/>
+          </a:stretch>
+        </p:blipFill>
+        <p:spPr>
+          <a:xfrm>
+            <a:off x="644400" y="1353600"/>
+            <a:ext cx="3351600" cy="3038400"/>
+          </a:xfrm>
+          <a:prstGeom prst="rect">
+            <a:avLst/>
+          </a:prstGeom>
+        </p:spPr>
+      </p:pic>
     </p:spTree>
   </p:cSld>
   <p:clrMapOvr>
@@ -4163,7 +4480,7 @@
       <p:grpSpPr/>
       <p:pic>
         <p:nvPicPr>
-          <p:cNvPr id="2" name="Picture 1" descr="bg3.png"/>
+          <p:cNvPr id="2" name="Picture 1" descr="bg2.png"/>
           <p:cNvPicPr>
             <a:picLocks noChangeAspect="1"/>
           </p:cNvPicPr>
@@ -4216,7 +4533,7 @@
               </a:defRPr>
             </a:pPr>
             <a:r>
-              <a:t>Record-setting BLEU scores on benchmark datasets.</a:t>
+              <a:t>Advancements in Machine Translation with the Transformer.</a:t>
             </a:r>
           </a:p>
         </p:txBody>
@@ -4252,22 +4569,7 @@
               </a:defRPr>
             </a:pPr>
             <a:r>
-              <a:t>- Transformer model sets new benchmarks in machine translation.</a:t>
-            </a:r>
-            <a:br/>
-            <a:br/>
-            <a:r>
-              <a:t>- Achieves 28.4 BLEU on English-to-German, surpassing prior bests.</a:t>
-            </a:r>
-            <a:br/>
-            <a:br/>
-            <a:r>
-              <a:t>- Records 41.8 BLEU for English-to-French, a new single-model high.</a:t>
-            </a:r>
-            <a:br/>
-            <a:br/>
-            <a:r>
-              <a:t>- Training on 8 GPUs for 3.5 days reduces costs significantly.</a:t>
+              <a:t>- **The Transformer Model Architecture**: A novel neural network that computes input and output representations entirely through self-attention, bypassing the need for RNNs or convolution.</a:t>
             </a:r>
           </a:p>
         </p:txBody>
@@ -4344,9 +4646,6 @@
                 <a:latin typeface="Calibri"/>
               </a:defRPr>
             </a:pPr>
-            <a:r>
-              <a:t>Reduced training time and computational resources.</a:t>
-            </a:r>
           </a:p>
         </p:txBody>
       </p:sp>
@@ -4381,27 +4680,7 @@
               </a:defRPr>
             </a:pPr>
             <a:r>
-              <a:t>- Transformer architecture prioritizes efficiency.</a:t>
-            </a:r>
-            <a:br/>
-            <a:br/>
-            <a:r>
-              <a:t>- Achieves state-of-the-art results with less training time.</a:t>
-            </a:r>
-            <a:br/>
-            <a:br/>
-            <a:r>
-              <a:t>- Outperforms complex models on translation tasks.</a:t>
-            </a:r>
-            <a:br/>
-            <a:br/>
-            <a:r>
-              <a:t>- Requires significantly fewer computational resources.</a:t>
-            </a:r>
-            <a:br/>
-            <a:br/>
-            <a:r>
-              <a:t>- Demonstrates quick adaptability to new tasks.</a:t>
+              <a:t>- **Scaled Dot-Product Attention**: A key component of the Transformer, enabling the model to weigh the influence of different parts of the input data.</a:t>
             </a:r>
           </a:p>
         </p:txBody>

</xml_diff>

<commit_message>
chore: reorganize code repo
</commit_message>
<xml_diff>
--- a/my_ppts/attention_mode1.pptx
+++ b/my_ppts/attention_mode1.pptx
@@ -13,11 +13,6 @@
     <p:sldId id="261" r:id="rId12"/>
     <p:sldId id="262" r:id="rId13"/>
     <p:sldId id="263" r:id="rId14"/>
-    <p:sldId id="264" r:id="rId15"/>
-    <p:sldId id="265" r:id="rId16"/>
-    <p:sldId id="266" r:id="rId17"/>
-    <p:sldId id="267" r:id="rId18"/>
-    <p:sldId id="268" r:id="rId19"/>
   </p:sldIdLst>
   <p:sldSz cx="9144000" cy="5144400" type="screen4x3"/>
   <p:notesSz cx="6858000" cy="9144000"/>
@@ -3155,7 +3150,7 @@
               </a:defRPr>
             </a:pPr>
             <a:r>
-              <a:t>Title: "Revolutionizing Machine Translation: The Transformer's Self-Attention Architecture"</a:t>
+              <a:t>"Revolutionizing Sequence Transduction: Unveiling the Transformer Architecture and Attention Innovations"</a:t>
             </a:r>
           </a:p>
         </p:txBody>
@@ -3168,7 +3163,146 @@
 </p:sld>
 </file>
 
-<file path=ppt/slides/slide10.xml><?xml version="1.0" encoding="utf-8"?>
+<file path=ppt/slides/slide2.xml><?xml version="1.0" encoding="utf-8"?>
+<p:sld xmlns:a="http://schemas.openxmlformats.org/drawingml/2006/main" xmlns:p="http://schemas.openxmlformats.org/presentationml/2006/main" xmlns:r="http://schemas.openxmlformats.org/officeDocument/2006/relationships">
+  <p:cSld>
+    <p:spTree>
+      <p:nvGrpSpPr>
+        <p:cNvPr id="1" name=""/>
+        <p:cNvGrpSpPr/>
+        <p:nvPr/>
+      </p:nvGrpSpPr>
+      <p:grpSpPr/>
+      <p:pic>
+        <p:nvPicPr>
+          <p:cNvPr id="2" name="Picture 1" descr="bg2.png"/>
+          <p:cNvPicPr>
+            <a:picLocks noChangeAspect="1"/>
+          </p:cNvPicPr>
+          <p:nvPr/>
+        </p:nvPicPr>
+        <p:blipFill>
+          <a:blip r:embed="rId2"/>
+          <a:stretch>
+            <a:fillRect/>
+          </a:stretch>
+        </p:blipFill>
+        <p:spPr>
+          <a:xfrm>
+            <a:off x="0" y="0"/>
+            <a:ext cx="9144000" cy="5144400"/>
+          </a:xfrm>
+          <a:prstGeom prst="rect">
+            <a:avLst/>
+          </a:prstGeom>
+        </p:spPr>
+      </p:pic>
+      <p:sp>
+        <p:nvSpPr>
+          <p:cNvPr id="3" name="TextBox 2"/>
+          <p:cNvSpPr txBox="1"/>
+          <p:nvPr/>
+        </p:nvSpPr>
+        <p:spPr>
+          <a:xfrm>
+            <a:off x="3794399" y="360000"/>
+            <a:ext cx="1558800" cy="784800"/>
+          </a:xfrm>
+          <a:prstGeom prst="rect">
+            <a:avLst/>
+          </a:prstGeom>
+          <a:noFill/>
+        </p:spPr>
+        <p:txBody>
+          <a:bodyPr wrap="none" anchor="t">
+            <a:spAutoFit/>
+          </a:bodyPr>
+          <a:lstStyle/>
+          <a:p>
+            <a:pPr>
+              <a:defRPr b="1" sz="4000">
+                <a:solidFill>
+                  <a:srgbClr val="000000"/>
+                </a:solidFill>
+                <a:latin typeface="Times New Roman"/>
+              </a:defRPr>
+            </a:pPr>
+            <a:r>
+              <a:t>Table of Contents</a:t>
+            </a:r>
+          </a:p>
+        </p:txBody>
+      </p:sp>
+      <p:sp>
+        <p:nvSpPr>
+          <p:cNvPr id="4" name="TextBox 3"/>
+          <p:cNvSpPr txBox="1"/>
+          <p:nvPr/>
+        </p:nvSpPr>
+        <p:spPr>
+          <a:xfrm>
+            <a:off x="4208400" y="1353600"/>
+            <a:ext cx="4287600" cy="3056400"/>
+          </a:xfrm>
+          <a:prstGeom prst="rect">
+            <a:avLst/>
+          </a:prstGeom>
+          <a:noFill/>
+        </p:spPr>
+        <p:txBody>
+          <a:bodyPr wrap="square" anchor="t">
+            <a:spAutoFit/>
+          </a:bodyPr>
+          <a:lstStyle/>
+          <a:p>
+            <a:pPr>
+              <a:defRPr sz="1200">
+                <a:solidFill>
+                  <a:srgbClr val="000000"/>
+                </a:solidFill>
+                <a:latin typeface="Times New Roman"/>
+              </a:defRPr>
+            </a:pPr>
+            <a:r>
+              <a:t>Introduction</a:t>
+            </a:r>
+            <a:br/>
+            <a:br/>
+            <a:r>
+              <a:t>The Transformer: A Novel Model Architecture</a:t>
+            </a:r>
+            <a:br/>
+            <a:br/>
+            <a:r>
+              <a:t>Scaled Dot-Product Attention: Enhancing Computational Efficiency</a:t>
+            </a:r>
+            <a:br/>
+            <a:br/>
+            <a:r>
+              <a:t>Multi-Head Attention: Parallel Processing Innovation</a:t>
+            </a:r>
+            <a:br/>
+            <a:br/>
+            <a:r>
+              <a:t>Self-Attention: A Key to Model Interpretability and Performance</a:t>
+            </a:r>
+            <a:br/>
+            <a:br/>
+            <a:r>
+              <a:t>Conclusion</a:t>
+            </a:r>
+          </a:p>
+        </p:txBody>
+      </p:sp>
+    </p:spTree>
+  </p:cSld>
+  <p:clrMapOvr>
+    <a:masterClrMapping/>
+  </p:clrMapOvr>
+</p:sld>
+</file>
+
+<file path=ppt/slides/slide3.xml><?xml version="1.0" encoding="utf-8"?>
 <p:sld xmlns:a="http://schemas.openxmlformats.org/drawingml/2006/main" xmlns:p="http://schemas.openxmlformats.org/presentationml/2006/main" xmlns:r="http://schemas.openxmlformats.org/officeDocument/2006/relationships">
   <p:cSld>
     <p:spTree>
@@ -3232,6 +3366,9 @@
                 <a:latin typeface="Calibri"/>
               </a:defRPr>
             </a:pPr>
+            <a:r>
+              <a:t>Introduction</a:t>
+            </a:r>
           </a:p>
         </p:txBody>
       </p:sp>
@@ -3266,7 +3403,22 @@
               </a:defRPr>
             </a:pPr>
             <a:r>
-              <a:t>- **Multi-Head Attention**: This feature of the Transformer allows for parallel processing of multiple attention layers, enhancing the model's ability to focus on various parts of the input sequence.</a:t>
+              <a:t>- Unveiling the Transformer: A groundbreaking architecture revolutionizing sequence transduction through pure attention mechanisms.</a:t>
+            </a:r>
+            <a:br/>
+            <a:br/>
+            <a:r>
+              <a:t>- Decoding Scaled Dot-Product Attention: The key to efficient, nuanced language processing.</a:t>
+            </a:r>
+            <a:br/>
+            <a:br/>
+            <a:r>
+              <a:t>- Harnessing the power of parallelism with Multi-Head Attention for faster, more complex tasks.</a:t>
+            </a:r>
+            <a:br/>
+            <a:br/>
+            <a:r>
+              <a:t>- The Transformer's model structure: A paradigm shift from recurrent layers to a streamlined, attention-centric design.</a:t>
             </a:r>
           </a:p>
         </p:txBody>
@@ -3279,7 +3431,160 @@
 </p:sld>
 </file>
 
-<file path=ppt/slides/slide11.xml><?xml version="1.0" encoding="utf-8"?>
+<file path=ppt/slides/slide4.xml><?xml version="1.0" encoding="utf-8"?>
+<p:sld xmlns:a="http://schemas.openxmlformats.org/drawingml/2006/main" xmlns:p="http://schemas.openxmlformats.org/presentationml/2006/main" xmlns:r="http://schemas.openxmlformats.org/officeDocument/2006/relationships">
+  <p:cSld>
+    <p:spTree>
+      <p:nvGrpSpPr>
+        <p:cNvPr id="1" name=""/>
+        <p:cNvGrpSpPr/>
+        <p:nvPr/>
+      </p:nvGrpSpPr>
+      <p:grpSpPr/>
+      <p:pic>
+        <p:nvPicPr>
+          <p:cNvPr id="2" name="Picture 1" descr="bg3.png"/>
+          <p:cNvPicPr>
+            <a:picLocks noChangeAspect="1"/>
+          </p:cNvPicPr>
+          <p:nvPr/>
+        </p:nvPicPr>
+        <p:blipFill>
+          <a:blip r:embed="rId2"/>
+          <a:stretch>
+            <a:fillRect/>
+          </a:stretch>
+        </p:blipFill>
+        <p:spPr>
+          <a:xfrm>
+            <a:off x="0" y="0"/>
+            <a:ext cx="9144000" cy="5144400"/>
+          </a:xfrm>
+          <a:prstGeom prst="rect">
+            <a:avLst/>
+          </a:prstGeom>
+        </p:spPr>
+      </p:pic>
+      <p:sp>
+        <p:nvSpPr>
+          <p:cNvPr id="3" name="TextBox 2"/>
+          <p:cNvSpPr txBox="1"/>
+          <p:nvPr/>
+        </p:nvSpPr>
+        <p:spPr>
+          <a:xfrm>
+            <a:off x="968400" y="550800"/>
+            <a:ext cx="6958799" cy="399600"/>
+          </a:xfrm>
+          <a:prstGeom prst="rect">
+            <a:avLst/>
+          </a:prstGeom>
+          <a:noFill/>
+        </p:spPr>
+        <p:txBody>
+          <a:bodyPr wrap="none" anchor="t">
+            <a:spAutoFit/>
+          </a:bodyPr>
+          <a:lstStyle/>
+          <a:p>
+            <a:pPr>
+              <a:defRPr b="1" sz="2000">
+                <a:solidFill>
+                  <a:srgbClr val="000000"/>
+                </a:solidFill>
+                <a:latin typeface="Calibri"/>
+              </a:defRPr>
+            </a:pPr>
+            <a:r>
+              <a:t>The Transformer: A Novel Model Architecture</a:t>
+            </a:r>
+          </a:p>
+        </p:txBody>
+      </p:sp>
+      <p:sp>
+        <p:nvSpPr>
+          <p:cNvPr id="4" name="TextBox 3"/>
+          <p:cNvSpPr txBox="1"/>
+          <p:nvPr/>
+        </p:nvSpPr>
+        <p:spPr>
+          <a:xfrm>
+            <a:off x="4208400" y="1353600"/>
+            <a:ext cx="4287600" cy="3056400"/>
+          </a:xfrm>
+          <a:prstGeom prst="rect">
+            <a:avLst/>
+          </a:prstGeom>
+          <a:noFill/>
+        </p:spPr>
+        <p:txBody>
+          <a:bodyPr wrap="square" anchor="t">
+            <a:spAutoFit/>
+          </a:bodyPr>
+          <a:lstStyle/>
+          <a:p>
+            <a:pPr>
+              <a:defRPr sz="1200">
+                <a:solidFill>
+                  <a:srgbClr val="000000"/>
+                </a:solidFill>
+                <a:latin typeface="Calibri"/>
+              </a:defRPr>
+            </a:pPr>
+            <a:r>
+              <a:t>- **The Transformer - Model Architecture**: A revolutionary encoder-decoder structure, eschewing RNNs for stacked self-attention layers.</a:t>
+            </a:r>
+            <a:br/>
+            <a:br/>
+            <a:r>
+              <a:t>- **Scaled Dot-Product Attention**: Enhances the model's focus, scaling dot products by inverse square root of dimensionality for balance.</a:t>
+            </a:r>
+            <a:br/>
+            <a:br/>
+            <a:r>
+              <a:t>- **Multi-Head Attention**: Operates in parallel, allowing the model to process diverse information simultaneously, enhancing efficiency.</a:t>
+            </a:r>
+            <a:br/>
+            <a:br/>
+            <a:r>
+              <a:t>- **Parallel Processing Capabilities**: Facilitates faster training and superior performance in tasks like language translation and parsing.</a:t>
+            </a:r>
+          </a:p>
+        </p:txBody>
+      </p:sp>
+      <p:pic>
+        <p:nvPicPr>
+          <p:cNvPr id="5" name="Picture 4" descr="Figure_1_0.png"/>
+          <p:cNvPicPr>
+            <a:picLocks noChangeAspect="1"/>
+          </p:cNvPicPr>
+          <p:nvPr/>
+        </p:nvPicPr>
+        <p:blipFill>
+          <a:blip r:embed="rId3"/>
+          <a:stretch>
+            <a:fillRect/>
+          </a:stretch>
+        </p:blipFill>
+        <p:spPr>
+          <a:xfrm>
+            <a:off x="644400" y="1353600"/>
+            <a:ext cx="3351600" cy="3038400"/>
+          </a:xfrm>
+          <a:prstGeom prst="rect">
+            <a:avLst/>
+          </a:prstGeom>
+        </p:spPr>
+      </p:pic>
+    </p:spTree>
+  </p:cSld>
+  <p:clrMapOvr>
+    <a:masterClrMapping/>
+  </p:clrMapOvr>
+</p:sld>
+</file>
+
+<file path=ppt/slides/slide5.xml><?xml version="1.0" encoding="utf-8"?>
 <p:sld xmlns:a="http://schemas.openxmlformats.org/drawingml/2006/main" xmlns:p="http://schemas.openxmlformats.org/presentationml/2006/main" xmlns:r="http://schemas.openxmlformats.org/officeDocument/2006/relationships">
   <p:cSld>
     <p:spTree>
@@ -3343,6 +3648,9 @@
                 <a:latin typeface="Calibri"/>
               </a:defRPr>
             </a:pPr>
+            <a:r>
+              <a:t>Scaled Dot-Product Attention: Enhancing Computational Efficiency</a:t>
+            </a:r>
           </a:p>
         </p:txBody>
       </p:sp>
@@ -3377,762 +3685,29 @@
               </a:defRPr>
             </a:pPr>
             <a:r>
-              <a:t>- **Performance in Machine Translation**: The Transformer demonstrates superior efficiency and effectiveness in machine translation tasks, outperforming previous RNN and CNN-based models.</a:t>
-            </a:r>
-          </a:p>
-        </p:txBody>
-      </p:sp>
-    </p:spTree>
-  </p:cSld>
-  <p:clrMapOvr>
-    <a:masterClrMapping/>
-  </p:clrMapOvr>
-</p:sld>
-</file>
-
-<file path=ppt/slides/slide12.xml><?xml version="1.0" encoding="utf-8"?>
-<p:sld xmlns:a="http://schemas.openxmlformats.org/drawingml/2006/main" xmlns:p="http://schemas.openxmlformats.org/presentationml/2006/main" xmlns:r="http://schemas.openxmlformats.org/officeDocument/2006/relationships">
-  <p:cSld>
-    <p:spTree>
-      <p:nvGrpSpPr>
-        <p:cNvPr id="1" name=""/>
-        <p:cNvGrpSpPr/>
-        <p:nvPr/>
-      </p:nvGrpSpPr>
-      <p:grpSpPr/>
+              <a:t>- **The Transformer Model Architecture**: A novel approach that uses stacked self-attention and point-wise, fully connected layers, eliminating traditional RNNs.</a:t>
+            </a:r>
+            <a:br/>
+            <a:br/>
+            <a:r>
+              <a:t>- **Scaled Dot-Product Attention**: This mechanism computes attention-driven output as a weighted sum, enhancing efficiency by scaling dot products.</a:t>
+            </a:r>
+            <a:br/>
+            <a:br/>
+            <a:r>
+              <a:t>- **Computational Efficiency**: Scaled attention counters large dot product values, preventing gradient issues and enabling faster, space-efficient operations.</a:t>
+            </a:r>
+            <a:br/>
+            <a:br/>
+            <a:r>
+              <a:t>- **Multi-Head Attention**: It runs several attention layers in parallel, allowing the model to handle different representation subspaces simultaneously.</a:t>
+            </a:r>
+          </a:p>
+        </p:txBody>
+      </p:sp>
       <p:pic>
         <p:nvPicPr>
-          <p:cNvPr id="2" name="Picture 1" descr="bg2.png"/>
-          <p:cNvPicPr>
-            <a:picLocks noChangeAspect="1"/>
-          </p:cNvPicPr>
-          <p:nvPr/>
-        </p:nvPicPr>
-        <p:blipFill>
-          <a:blip r:embed="rId2"/>
-          <a:stretch>
-            <a:fillRect/>
-          </a:stretch>
-        </p:blipFill>
-        <p:spPr>
-          <a:xfrm>
-            <a:off x="0" y="0"/>
-            <a:ext cx="9144000" cy="5144400"/>
-          </a:xfrm>
-          <a:prstGeom prst="rect">
-            <a:avLst/>
-          </a:prstGeom>
-        </p:spPr>
-      </p:pic>
-      <p:sp>
-        <p:nvSpPr>
-          <p:cNvPr id="3" name="TextBox 2"/>
-          <p:cNvSpPr txBox="1"/>
-          <p:nvPr/>
-        </p:nvSpPr>
-        <p:spPr>
-          <a:xfrm>
-            <a:off x="968400" y="550800"/>
-            <a:ext cx="6958799" cy="399600"/>
-          </a:xfrm>
-          <a:prstGeom prst="rect">
-            <a:avLst/>
-          </a:prstGeom>
-          <a:noFill/>
-        </p:spPr>
-        <p:txBody>
-          <a:bodyPr wrap="none" anchor="t">
-            <a:spAutoFit/>
-          </a:bodyPr>
-          <a:lstStyle/>
-          <a:p>
-            <a:pPr>
-              <a:defRPr b="1" sz="2000">
-                <a:solidFill>
-                  <a:srgbClr val="000000"/>
-                </a:solidFill>
-                <a:latin typeface="Calibri"/>
-              </a:defRPr>
-            </a:pPr>
-            <a:r>
-              <a:t>Conclusion</a:t>
-            </a:r>
-          </a:p>
-        </p:txBody>
-      </p:sp>
-      <p:sp>
-        <p:nvSpPr>
-          <p:cNvPr id="4" name="TextBox 3"/>
-          <p:cNvSpPr txBox="1"/>
-          <p:nvPr/>
-        </p:nvSpPr>
-        <p:spPr>
-          <a:xfrm>
-            <a:off x="4208400" y="1353600"/>
-            <a:ext cx="4287600" cy="3056400"/>
-          </a:xfrm>
-          <a:prstGeom prst="rect">
-            <a:avLst/>
-          </a:prstGeom>
-          <a:noFill/>
-        </p:spPr>
-        <p:txBody>
-          <a:bodyPr wrap="square" anchor="t">
-            <a:spAutoFit/>
-          </a:bodyPr>
-          <a:lstStyle/>
-          <a:p>
-            <a:pPr>
-              <a:defRPr sz="1200">
-                <a:solidFill>
-                  <a:srgbClr val="000000"/>
-                </a:solidFill>
-                <a:latin typeface="Calibri"/>
-              </a:defRPr>
-            </a:pPr>
-            <a:r>
-              <a:t>In conclusion, the article encapsulates the transformative impact of the Transformer model on neural network architectures for machine translation:</a:t>
-            </a:r>
-          </a:p>
-        </p:txBody>
-      </p:sp>
-    </p:spTree>
-  </p:cSld>
-  <p:clrMapOvr>
-    <a:masterClrMapping/>
-  </p:clrMapOvr>
-</p:sld>
-</file>
-
-<file path=ppt/slides/slide13.xml><?xml version="1.0" encoding="utf-8"?>
-<p:sld xmlns:a="http://schemas.openxmlformats.org/drawingml/2006/main" xmlns:p="http://schemas.openxmlformats.org/presentationml/2006/main" xmlns:r="http://schemas.openxmlformats.org/officeDocument/2006/relationships">
-  <p:cSld>
-    <p:spTree>
-      <p:nvGrpSpPr>
-        <p:cNvPr id="1" name=""/>
-        <p:cNvGrpSpPr/>
-        <p:nvPr/>
-      </p:nvGrpSpPr>
-      <p:grpSpPr/>
-      <p:pic>
-        <p:nvPicPr>
-          <p:cNvPr id="2" name="Picture 1" descr="bg2.png"/>
-          <p:cNvPicPr>
-            <a:picLocks noChangeAspect="1"/>
-          </p:cNvPicPr>
-          <p:nvPr/>
-        </p:nvPicPr>
-        <p:blipFill>
-          <a:blip r:embed="rId2"/>
-          <a:stretch>
-            <a:fillRect/>
-          </a:stretch>
-        </p:blipFill>
-        <p:spPr>
-          <a:xfrm>
-            <a:off x="0" y="0"/>
-            <a:ext cx="9144000" cy="5144400"/>
-          </a:xfrm>
-          <a:prstGeom prst="rect">
-            <a:avLst/>
-          </a:prstGeom>
-        </p:spPr>
-      </p:pic>
-      <p:sp>
-        <p:nvSpPr>
-          <p:cNvPr id="3" name="TextBox 2"/>
-          <p:cNvSpPr txBox="1"/>
-          <p:nvPr/>
-        </p:nvSpPr>
-        <p:spPr>
-          <a:xfrm>
-            <a:off x="968400" y="550800"/>
-            <a:ext cx="6958799" cy="399600"/>
-          </a:xfrm>
-          <a:prstGeom prst="rect">
-            <a:avLst/>
-          </a:prstGeom>
-          <a:noFill/>
-        </p:spPr>
-        <p:txBody>
-          <a:bodyPr wrap="none" anchor="t">
-            <a:spAutoFit/>
-          </a:bodyPr>
-          <a:lstStyle/>
-          <a:p>
-            <a:pPr>
-              <a:defRPr b="1" sz="2000">
-                <a:solidFill>
-                  <a:srgbClr val="000000"/>
-                </a:solidFill>
-                <a:latin typeface="Calibri"/>
-              </a:defRPr>
-            </a:pPr>
-          </a:p>
-        </p:txBody>
-      </p:sp>
-      <p:sp>
-        <p:nvSpPr>
-          <p:cNvPr id="4" name="TextBox 3"/>
-          <p:cNvSpPr txBox="1"/>
-          <p:nvPr/>
-        </p:nvSpPr>
-        <p:spPr>
-          <a:xfrm>
-            <a:off x="4208400" y="1353600"/>
-            <a:ext cx="4287600" cy="3056400"/>
-          </a:xfrm>
-          <a:prstGeom prst="rect">
-            <a:avLst/>
-          </a:prstGeom>
-          <a:noFill/>
-        </p:spPr>
-        <p:txBody>
-          <a:bodyPr wrap="square" anchor="t">
-            <a:spAutoFit/>
-          </a:bodyPr>
-          <a:lstStyle/>
-          <a:p>
-            <a:pPr>
-              <a:defRPr sz="1200">
-                <a:solidFill>
-                  <a:srgbClr val="000000"/>
-                </a:solidFill>
-                <a:latin typeface="Calibri"/>
-              </a:defRPr>
-            </a:pPr>
-            <a:r>
-              <a:t>- Introduced the Transformer, a model eschewing recurrent and convolutional layers for self-attention.</a:t>
-            </a:r>
-            <a:br/>
-            <a:br/>
-            <a:r>
-              <a:t>- Detailed the Scaled Dot-Product Attention mechanism, central to the Transformer's interpretative power.</a:t>
-            </a:r>
-            <a:br/>
-            <a:br/>
-            <a:r>
-              <a:t>- Described Multi-Head Attention, enhancing parallel processing and contextual understanding.</a:t>
-            </a:r>
-            <a:br/>
-            <a:br/>
-            <a:r>
-              <a:t>- Highlighted the Transformer's superior performance and efficiency in machine translation tasks.</a:t>
-            </a:r>
-          </a:p>
-        </p:txBody>
-      </p:sp>
-    </p:spTree>
-  </p:cSld>
-  <p:clrMapOvr>
-    <a:masterClrMapping/>
-  </p:clrMapOvr>
-</p:sld>
-</file>
-
-<file path=ppt/slides/slide2.xml><?xml version="1.0" encoding="utf-8"?>
-<p:sld xmlns:a="http://schemas.openxmlformats.org/drawingml/2006/main" xmlns:p="http://schemas.openxmlformats.org/presentationml/2006/main" xmlns:r="http://schemas.openxmlformats.org/officeDocument/2006/relationships">
-  <p:cSld>
-    <p:spTree>
-      <p:nvGrpSpPr>
-        <p:cNvPr id="1" name=""/>
-        <p:cNvGrpSpPr/>
-        <p:nvPr/>
-      </p:nvGrpSpPr>
-      <p:grpSpPr/>
-      <p:pic>
-        <p:nvPicPr>
-          <p:cNvPr id="2" name="Picture 1" descr="bg1.png"/>
-          <p:cNvPicPr>
-            <a:picLocks noChangeAspect="1"/>
-          </p:cNvPicPr>
-          <p:nvPr/>
-        </p:nvPicPr>
-        <p:blipFill>
-          <a:blip r:embed="rId2"/>
-          <a:stretch>
-            <a:fillRect/>
-          </a:stretch>
-        </p:blipFill>
-        <p:spPr>
-          <a:xfrm>
-            <a:off x="0" y="0"/>
-            <a:ext cx="9144000" cy="5144400"/>
-          </a:xfrm>
-          <a:prstGeom prst="rect">
-            <a:avLst/>
-          </a:prstGeom>
-        </p:spPr>
-      </p:pic>
-      <p:sp>
-        <p:nvSpPr>
-          <p:cNvPr id="3" name="TextBox 2"/>
-          <p:cNvSpPr txBox="1"/>
-          <p:nvPr/>
-        </p:nvSpPr>
-        <p:spPr>
-          <a:xfrm>
-            <a:off x="3794399" y="360000"/>
-            <a:ext cx="1558800" cy="784800"/>
-          </a:xfrm>
-          <a:prstGeom prst="rect">
-            <a:avLst/>
-          </a:prstGeom>
-          <a:noFill/>
-        </p:spPr>
-        <p:txBody>
-          <a:bodyPr wrap="none" anchor="t">
-            <a:spAutoFit/>
-          </a:bodyPr>
-          <a:lstStyle/>
-          <a:p>
-            <a:pPr>
-              <a:defRPr b="1" sz="4000">
-                <a:solidFill>
-                  <a:srgbClr val="000000"/>
-                </a:solidFill>
-                <a:latin typeface="Times New Roman"/>
-              </a:defRPr>
-            </a:pPr>
-            <a:r>
-              <a:t>Table of Contents</a:t>
-            </a:r>
-          </a:p>
-        </p:txBody>
-      </p:sp>
-      <p:sp>
-        <p:nvSpPr>
-          <p:cNvPr id="4" name="TextBox 3"/>
-          <p:cNvSpPr txBox="1"/>
-          <p:nvPr/>
-        </p:nvSpPr>
-        <p:spPr>
-          <a:xfrm>
-            <a:off x="4208400" y="1353600"/>
-            <a:ext cx="4287600" cy="3056400"/>
-          </a:xfrm>
-          <a:prstGeom prst="rect">
-            <a:avLst/>
-          </a:prstGeom>
-          <a:noFill/>
-        </p:spPr>
-        <p:txBody>
-          <a:bodyPr wrap="square" anchor="t">
-            <a:spAutoFit/>
-          </a:bodyPr>
-          <a:lstStyle/>
-          <a:p>
-            <a:pPr>
-              <a:defRPr sz="1200">
-                <a:solidFill>
-                  <a:srgbClr val="000000"/>
-                </a:solidFill>
-                <a:latin typeface="Times New Roman"/>
-              </a:defRPr>
-            </a:pPr>
-            <a:r>
-              <a:t>Introduction</a:t>
-            </a:r>
-            <a:br/>
-            <a:br/>
-            <a:r>
-              <a:t>Introduction of the Transformer Model Architecture.</a:t>
-            </a:r>
-            <a:br/>
-            <a:br/>
-            <a:r>
-              <a:t>Implementation of Scaled Dot-Product Attention Mechanism.</a:t>
-            </a:r>
-            <a:br/>
-            <a:br/>
-            <a:r>
-              <a:t>Integration of Multi-Head Attention for Parallel Processing.</a:t>
-            </a:r>
-            <a:br/>
-            <a:br/>
-            <a:r>
-              <a:t>Advancements in Machine Translation with the Transformer.</a:t>
-            </a:r>
-            <a:br/>
-            <a:br/>
-            <a:r>
-              <a:t>Conclusion</a:t>
-            </a:r>
-          </a:p>
-        </p:txBody>
-      </p:sp>
-    </p:spTree>
-  </p:cSld>
-  <p:clrMapOvr>
-    <a:masterClrMapping/>
-  </p:clrMapOvr>
-</p:sld>
-</file>
-
-<file path=ppt/slides/slide3.xml><?xml version="1.0" encoding="utf-8"?>
-<p:sld xmlns:a="http://schemas.openxmlformats.org/drawingml/2006/main" xmlns:p="http://schemas.openxmlformats.org/presentationml/2006/main" xmlns:r="http://schemas.openxmlformats.org/officeDocument/2006/relationships">
-  <p:cSld>
-    <p:spTree>
-      <p:nvGrpSpPr>
-        <p:cNvPr id="1" name=""/>
-        <p:cNvGrpSpPr/>
-        <p:nvPr/>
-      </p:nvGrpSpPr>
-      <p:grpSpPr/>
-      <p:pic>
-        <p:nvPicPr>
-          <p:cNvPr id="2" name="Picture 1" descr="bg2.png"/>
-          <p:cNvPicPr>
-            <a:picLocks noChangeAspect="1"/>
-          </p:cNvPicPr>
-          <p:nvPr/>
-        </p:nvPicPr>
-        <p:blipFill>
-          <a:blip r:embed="rId2"/>
-          <a:stretch>
-            <a:fillRect/>
-          </a:stretch>
-        </p:blipFill>
-        <p:spPr>
-          <a:xfrm>
-            <a:off x="0" y="0"/>
-            <a:ext cx="9144000" cy="5144400"/>
-          </a:xfrm>
-          <a:prstGeom prst="rect">
-            <a:avLst/>
-          </a:prstGeom>
-        </p:spPr>
-      </p:pic>
-      <p:sp>
-        <p:nvSpPr>
-          <p:cNvPr id="3" name="TextBox 2"/>
-          <p:cNvSpPr txBox="1"/>
-          <p:nvPr/>
-        </p:nvSpPr>
-        <p:spPr>
-          <a:xfrm>
-            <a:off x="968400" y="550800"/>
-            <a:ext cx="6958799" cy="399600"/>
-          </a:xfrm>
-          <a:prstGeom prst="rect">
-            <a:avLst/>
-          </a:prstGeom>
-          <a:noFill/>
-        </p:spPr>
-        <p:txBody>
-          <a:bodyPr wrap="none" anchor="t">
-            <a:spAutoFit/>
-          </a:bodyPr>
-          <a:lstStyle/>
-          <a:p>
-            <a:pPr>
-              <a:defRPr b="1" sz="2000">
-                <a:solidFill>
-                  <a:srgbClr val="000000"/>
-                </a:solidFill>
-                <a:latin typeface="Calibri"/>
-              </a:defRPr>
-            </a:pPr>
-            <a:r>
-              <a:t>Introduction</a:t>
-            </a:r>
-          </a:p>
-        </p:txBody>
-      </p:sp>
-      <p:sp>
-        <p:nvSpPr>
-          <p:cNvPr id="4" name="TextBox 3"/>
-          <p:cNvSpPr txBox="1"/>
-          <p:nvPr/>
-        </p:nvSpPr>
-        <p:spPr>
-          <a:xfrm>
-            <a:off x="4208400" y="1353600"/>
-            <a:ext cx="4287600" cy="3056400"/>
-          </a:xfrm>
-          <a:prstGeom prst="rect">
-            <a:avLst/>
-          </a:prstGeom>
-          <a:noFill/>
-        </p:spPr>
-        <p:txBody>
-          <a:bodyPr wrap="square" anchor="t">
-            <a:spAutoFit/>
-          </a:bodyPr>
-          <a:lstStyle/>
-          <a:p>
-            <a:pPr>
-              <a:defRPr sz="1200">
-                <a:solidFill>
-                  <a:srgbClr val="000000"/>
-                </a:solidFill>
-                <a:latin typeface="Calibri"/>
-              </a:defRPr>
-            </a:pPr>
-            <a:r>
-              <a:t>In the rapidly evolving field of neural network architectures, the Transformer stands out as a groundbreaking model that revolutionizes machine translation. Here's an overview of its core concepts:</a:t>
-            </a:r>
-          </a:p>
-        </p:txBody>
-      </p:sp>
-    </p:spTree>
-  </p:cSld>
-  <p:clrMapOvr>
-    <a:masterClrMapping/>
-  </p:clrMapOvr>
-</p:sld>
-</file>
-
-<file path=ppt/slides/slide4.xml><?xml version="1.0" encoding="utf-8"?>
-<p:sld xmlns:a="http://schemas.openxmlformats.org/drawingml/2006/main" xmlns:p="http://schemas.openxmlformats.org/presentationml/2006/main" xmlns:r="http://schemas.openxmlformats.org/officeDocument/2006/relationships">
-  <p:cSld>
-    <p:spTree>
-      <p:nvGrpSpPr>
-        <p:cNvPr id="1" name=""/>
-        <p:cNvGrpSpPr/>
-        <p:nvPr/>
-      </p:nvGrpSpPr>
-      <p:grpSpPr/>
-      <p:pic>
-        <p:nvPicPr>
-          <p:cNvPr id="2" name="Picture 1" descr="bg2.png"/>
-          <p:cNvPicPr>
-            <a:picLocks noChangeAspect="1"/>
-          </p:cNvPicPr>
-          <p:nvPr/>
-        </p:nvPicPr>
-        <p:blipFill>
-          <a:blip r:embed="rId2"/>
-          <a:stretch>
-            <a:fillRect/>
-          </a:stretch>
-        </p:blipFill>
-        <p:spPr>
-          <a:xfrm>
-            <a:off x="0" y="0"/>
-            <a:ext cx="9144000" cy="5144400"/>
-          </a:xfrm>
-          <a:prstGeom prst="rect">
-            <a:avLst/>
-          </a:prstGeom>
-        </p:spPr>
-      </p:pic>
-      <p:sp>
-        <p:nvSpPr>
-          <p:cNvPr id="3" name="TextBox 2"/>
-          <p:cNvSpPr txBox="1"/>
-          <p:nvPr/>
-        </p:nvSpPr>
-        <p:spPr>
-          <a:xfrm>
-            <a:off x="968400" y="550800"/>
-            <a:ext cx="6958799" cy="399600"/>
-          </a:xfrm>
-          <a:prstGeom prst="rect">
-            <a:avLst/>
-          </a:prstGeom>
-          <a:noFill/>
-        </p:spPr>
-        <p:txBody>
-          <a:bodyPr wrap="none" anchor="t">
-            <a:spAutoFit/>
-          </a:bodyPr>
-          <a:lstStyle/>
-          <a:p>
-            <a:pPr>
-              <a:defRPr b="1" sz="2000">
-                <a:solidFill>
-                  <a:srgbClr val="000000"/>
-                </a:solidFill>
-                <a:latin typeface="Calibri"/>
-              </a:defRPr>
-            </a:pPr>
-          </a:p>
-        </p:txBody>
-      </p:sp>
-      <p:sp>
-        <p:nvSpPr>
-          <p:cNvPr id="4" name="TextBox 3"/>
-          <p:cNvSpPr txBox="1"/>
-          <p:nvPr/>
-        </p:nvSpPr>
-        <p:spPr>
-          <a:xfrm>
-            <a:off x="4208400" y="1353600"/>
-            <a:ext cx="4287600" cy="3056400"/>
-          </a:xfrm>
-          <a:prstGeom prst="rect">
-            <a:avLst/>
-          </a:prstGeom>
-          <a:noFill/>
-        </p:spPr>
-        <p:txBody>
-          <a:bodyPr wrap="square" anchor="t">
-            <a:spAutoFit/>
-          </a:bodyPr>
-          <a:lstStyle/>
-          <a:p>
-            <a:pPr>
-              <a:defRPr sz="1200">
-                <a:solidFill>
-                  <a:srgbClr val="000000"/>
-                </a:solidFill>
-                <a:latin typeface="Calibri"/>
-              </a:defRPr>
-            </a:pPr>
-            <a:r>
-              <a:t>- **The Transformer Model Architecture**: A pioneering approach that eschews traditional recurrent and convolutional layers in favor of a design powered entirely by self-attention mechanisms.</a:t>
-            </a:r>
-            <a:br/>
-            <a:br/>
-            <a:r>
-              <a:t>- **Scaled Dot-Product Attention**: The crux of the Transformer, enabling dynamic weighting of input significance, which enhances the model's interpretative ability.</a:t>
-            </a:r>
-            <a:br/>
-            <a:br/>
-            <a:r>
-              <a:t>- **Multi-Head Attention**: A novel structure that runs several attention mechanisms in parallel, refining the model's focus and improving its capacity to capture diverse contextual nuances.</a:t>
-            </a:r>
-            <a:br/>
-            <a:br/>
-            <a:r>
-              <a:t>- **Performance and Efficiency**: The Transformer demonstrates superior translation quality, achieving state-of-the-art results with remarkable training efficiency, a testament to its advanced design.</a:t>
-            </a:r>
-          </a:p>
-        </p:txBody>
-      </p:sp>
-    </p:spTree>
-  </p:cSld>
-  <p:clrMapOvr>
-    <a:masterClrMapping/>
-  </p:clrMapOvr>
-</p:sld>
-</file>
-
-<file path=ppt/slides/slide5.xml><?xml version="1.0" encoding="utf-8"?>
-<p:sld xmlns:a="http://schemas.openxmlformats.org/drawingml/2006/main" xmlns:p="http://schemas.openxmlformats.org/presentationml/2006/main" xmlns:r="http://schemas.openxmlformats.org/officeDocument/2006/relationships">
-  <p:cSld>
-    <p:spTree>
-      <p:nvGrpSpPr>
-        <p:cNvPr id="1" name=""/>
-        <p:cNvGrpSpPr/>
-        <p:nvPr/>
-      </p:nvGrpSpPr>
-      <p:grpSpPr/>
-      <p:pic>
-        <p:nvPicPr>
-          <p:cNvPr id="2" name="Picture 1" descr="bg3.png"/>
-          <p:cNvPicPr>
-            <a:picLocks noChangeAspect="1"/>
-          </p:cNvPicPr>
-          <p:nvPr/>
-        </p:nvPicPr>
-        <p:blipFill>
-          <a:blip r:embed="rId2"/>
-          <a:stretch>
-            <a:fillRect/>
-          </a:stretch>
-        </p:blipFill>
-        <p:spPr>
-          <a:xfrm>
-            <a:off x="0" y="0"/>
-            <a:ext cx="9144000" cy="5144400"/>
-          </a:xfrm>
-          <a:prstGeom prst="rect">
-            <a:avLst/>
-          </a:prstGeom>
-        </p:spPr>
-      </p:pic>
-      <p:sp>
-        <p:nvSpPr>
-          <p:cNvPr id="3" name="TextBox 2"/>
-          <p:cNvSpPr txBox="1"/>
-          <p:nvPr/>
-        </p:nvSpPr>
-        <p:spPr>
-          <a:xfrm>
-            <a:off x="968400" y="550800"/>
-            <a:ext cx="6958799" cy="399600"/>
-          </a:xfrm>
-          <a:prstGeom prst="rect">
-            <a:avLst/>
-          </a:prstGeom>
-          <a:noFill/>
-        </p:spPr>
-        <p:txBody>
-          <a:bodyPr wrap="none" anchor="t">
-            <a:spAutoFit/>
-          </a:bodyPr>
-          <a:lstStyle/>
-          <a:p>
-            <a:pPr>
-              <a:defRPr b="1" sz="2000">
-                <a:solidFill>
-                  <a:srgbClr val="000000"/>
-                </a:solidFill>
-                <a:latin typeface="Calibri"/>
-              </a:defRPr>
-            </a:pPr>
-            <a:r>
-              <a:t>Introduction of the Transformer Model Architecture.</a:t>
-            </a:r>
-          </a:p>
-        </p:txBody>
-      </p:sp>
-      <p:sp>
-        <p:nvSpPr>
-          <p:cNvPr id="4" name="TextBox 3"/>
-          <p:cNvSpPr txBox="1"/>
-          <p:nvPr/>
-        </p:nvSpPr>
-        <p:spPr>
-          <a:xfrm>
-            <a:off x="4208400" y="1353600"/>
-            <a:ext cx="4287600" cy="3056400"/>
-          </a:xfrm>
-          <a:prstGeom prst="rect">
-            <a:avLst/>
-          </a:prstGeom>
-          <a:noFill/>
-        </p:spPr>
-        <p:txBody>
-          <a:bodyPr wrap="square" anchor="t">
-            <a:spAutoFit/>
-          </a:bodyPr>
-          <a:lstStyle/>
-          <a:p>
-            <a:pPr>
-              <a:defRPr sz="1200">
-                <a:solidFill>
-                  <a:srgbClr val="000000"/>
-                </a:solidFill>
-                <a:latin typeface="Calibri"/>
-              </a:defRPr>
-            </a:pPr>
-            <a:r>
-              <a:t>- **The Transformer Model Architecture**: A novel neural network design that eliminates recurrent layers in favor of self-attention mechanisms, optimizing machine translation tasks.</a:t>
-            </a:r>
-            <a:br/>
-            <a:br/>
-            <a:r>
-              <a:t>- **Scaled Dot-Product Attention**: A key component that computes attention scores, influencing the model's focus during sequence transduction.</a:t>
-            </a:r>
-            <a:br/>
-            <a:br/>
-            <a:r>
-              <a:t>- **Multi-Head Attention**: Operates with parallel attention layers, each providing a unique perspective, enhancing the model's ability to learn from different positional contexts.</a:t>
-            </a:r>
-            <a:br/>
-            <a:br/>
-            <a:r>
-              <a:t>- **Performance and Efficiency**: The Transformer demonstrates superior results in machine translation, outperforming previous architectures while maintaining efficiency.</a:t>
-            </a:r>
-          </a:p>
-        </p:txBody>
-      </p:sp>
-      <p:pic>
-        <p:nvPicPr>
-          <p:cNvPr id="5" name="Picture 4" descr="Figure_1_0.png"/>
+          <p:cNvPr id="5" name="Picture 4" descr="Figure_2_0.png"/>
           <p:cNvPicPr>
             <a:picLocks noChangeAspect="1"/>
           </p:cNvPicPr>
@@ -4227,7 +3802,7 @@
               </a:defRPr>
             </a:pPr>
             <a:r>
-              <a:t>Implementation of Scaled Dot-Product Attention Mechanism.</a:t>
+              <a:t>Multi-Head Attention: Parallel Processing Innovation</a:t>
             </a:r>
           </a:p>
         </p:txBody>
@@ -4263,29 +3838,29 @@
               </a:defRPr>
             </a:pPr>
             <a:r>
-              <a:t>- **The Transformer Model Architecture**: A novel neural network design that eliminates recurrent layers in favor of self-attention mechanisms.</a:t>
-            </a:r>
-            <a:br/>
-            <a:br/>
-            <a:r>
-              <a:t>- **Scaled Dot-Product Attention**: A key component of the Transformer, calculating attention as a weighted sum of values based on query-key compatibility.</a:t>
-            </a:r>
-            <a:br/>
-            <a:br/>
-            <a:r>
-              <a:t>- **Multi-Head Attention**: This feature runs several attention layers in parallel, enhancing the model's ability to focus on different positions.</a:t>
-            </a:r>
-            <a:br/>
-            <a:br/>
-            <a:r>
-              <a:t>- **Efficiency in Machine Translation**: The Transformer demonstrates superior performance in translation tasks, outperforming RNN-based models.</a:t>
+              <a:t>- **The Transformer Model Architecture**: Innovatively structured, it uses stacked self-attention and fully connected layers, eliminating recurrent processes.</a:t>
+            </a:r>
+            <a:br/>
+            <a:br/>
+            <a:r>
+              <a:t>- **Scaled Dot-Product Attention**: This mechanism scales dot products by inverse square root of the dimension, facilitating efficient attention weight calculation.</a:t>
+            </a:r>
+            <a:br/>
+            <a:br/>
+            <a:r>
+              <a:t>- **Multi-Head Attention**: Employs parallel attention layers, allowing the model to process different representation subspaces simultaneously.</a:t>
+            </a:r>
+            <a:br/>
+            <a:br/>
+            <a:r>
+              <a:t>- **Parallel Processing Capabilities**: Enhances performance and training efficiency, as multiple attention heads operate concurrently, reducing computational cost.</a:t>
             </a:r>
           </a:p>
         </p:txBody>
       </p:sp>
       <p:pic>
         <p:nvPicPr>
-          <p:cNvPr id="5" name="Picture 4" descr="Figure_2_0.png"/>
+          <p:cNvPr id="5" name="Picture 4" descr="Figure_2_1.png"/>
           <p:cNvPicPr>
             <a:picLocks noChangeAspect="1"/>
           </p:cNvPicPr>
@@ -4327,7 +3902,7 @@
       <p:grpSpPr/>
       <p:pic>
         <p:nvPicPr>
-          <p:cNvPr id="2" name="Picture 1" descr="bg2.png"/>
+          <p:cNvPr id="2" name="Picture 1" descr="bg1.png"/>
           <p:cNvPicPr>
             <a:picLocks noChangeAspect="1"/>
           </p:cNvPicPr>
@@ -4380,7 +3955,7 @@
               </a:defRPr>
             </a:pPr>
             <a:r>
-              <a:t>Integration of Multi-Head Attention for Parallel Processing.</a:t>
+              <a:t>Self-Attention: A Key to Model Interpretability and Performance</a:t>
             </a:r>
           </a:p>
         </p:txBody>
@@ -4416,50 +3991,26 @@
               </a:defRPr>
             </a:pPr>
             <a:r>
-              <a:t>- **The Transformer Model Architecture**: Innovatively structured, it computes input and output representations in parallel, leveraging self-attention for efficiency.</a:t>
-            </a:r>
-            <a:br/>
-            <a:br/>
-            <a:r>
-              <a:t>- **Scaled Dot-Product Attention**: A key component, it scales attention with input size, optimizing the self-attention process for varying sequence lengths.</a:t>
-            </a:r>
-            <a:br/>
-            <a:br/>
-            <a:r>
-              <a:t>- **Multi-Head Attention**: This feature runs multiple attention layers concurrently, enhancing the model's ability to focus on different positions and represent complex dependencies.</a:t>
-            </a:r>
-            <a:br/>
-            <a:br/>
-            <a:r>
-              <a:t>- **Performance in Machine Translation**: The Transformer demonstrates superior efficiency and effectiveness in translation tasks, outperforming RNN and CNN models.</a:t>
-            </a:r>
-          </a:p>
-        </p:txBody>
-      </p:sp>
-      <p:pic>
-        <p:nvPicPr>
-          <p:cNvPr id="5" name="Picture 4" descr="Figure_2_1.png"/>
-          <p:cNvPicPr>
-            <a:picLocks noChangeAspect="1"/>
-          </p:cNvPicPr>
-          <p:nvPr/>
-        </p:nvPicPr>
-        <p:blipFill>
-          <a:blip r:embed="rId3"/>
-          <a:stretch>
-            <a:fillRect/>
-          </a:stretch>
-        </p:blipFill>
-        <p:spPr>
-          <a:xfrm>
-            <a:off x="644400" y="1353600"/>
-            <a:ext cx="3351600" cy="3038400"/>
-          </a:xfrm>
-          <a:prstGeom prst="rect">
-            <a:avLst/>
-          </a:prstGeom>
-        </p:spPr>
-      </p:pic>
+              <a:t>- **The Transformer Model Architecture**: Innovatively structured for sequence transduction, it eliminates recurrent layers, relying solely on attention mechanisms for input-output representations.</a:t>
+            </a:r>
+            <a:br/>
+            <a:br/>
+            <a:r>
+              <a:t>- **Scaled Dot-Product Attention**: This attention mechanism computes outputs as weighted sums, enhancing interpretability by relating different sequence positions directly and efficiently.</a:t>
+            </a:r>
+            <a:br/>
+            <a:br/>
+            <a:r>
+              <a:t>- **Multi-Head Attention**: Operates in parallel, allowing the model to process various sequence parts simultaneously, improving performance and interpretability across different subspaces.</a:t>
+            </a:r>
+            <a:br/>
+            <a:br/>
+            <a:r>
+              <a:t>- **Self-Attention's Role**: Central to the Transformer, it enables direct modeling of dependencies, regardless of sequence distance, contributing to both model performance and interpretability.</a:t>
+            </a:r>
+          </a:p>
+        </p:txBody>
+      </p:sp>
     </p:spTree>
   </p:cSld>
   <p:clrMapOvr>
@@ -4533,7 +4084,7 @@
               </a:defRPr>
             </a:pPr>
             <a:r>
-              <a:t>Advancements in Machine Translation with the Transformer.</a:t>
+              <a:t>Conclusion</a:t>
             </a:r>
           </a:p>
         </p:txBody>
@@ -4569,118 +4120,22 @@
               </a:defRPr>
             </a:pPr>
             <a:r>
-              <a:t>- **The Transformer Model Architecture**: A novel neural network that computes input and output representations entirely through self-attention, bypassing the need for RNNs or convolution.</a:t>
-            </a:r>
-          </a:p>
-        </p:txBody>
-      </p:sp>
-    </p:spTree>
-  </p:cSld>
-  <p:clrMapOvr>
-    <a:masterClrMapping/>
-  </p:clrMapOvr>
-</p:sld>
-</file>
-
-<file path=ppt/slides/slide9.xml><?xml version="1.0" encoding="utf-8"?>
-<p:sld xmlns:a="http://schemas.openxmlformats.org/drawingml/2006/main" xmlns:p="http://schemas.openxmlformats.org/presentationml/2006/main" xmlns:r="http://schemas.openxmlformats.org/officeDocument/2006/relationships">
-  <p:cSld>
-    <p:spTree>
-      <p:nvGrpSpPr>
-        <p:cNvPr id="1" name=""/>
-        <p:cNvGrpSpPr/>
-        <p:nvPr/>
-      </p:nvGrpSpPr>
-      <p:grpSpPr/>
-      <p:pic>
-        <p:nvPicPr>
-          <p:cNvPr id="2" name="Picture 1" descr="bg2.png"/>
-          <p:cNvPicPr>
-            <a:picLocks noChangeAspect="1"/>
-          </p:cNvPicPr>
-          <p:nvPr/>
-        </p:nvPicPr>
-        <p:blipFill>
-          <a:blip r:embed="rId2"/>
-          <a:stretch>
-            <a:fillRect/>
-          </a:stretch>
-        </p:blipFill>
-        <p:spPr>
-          <a:xfrm>
-            <a:off x="0" y="0"/>
-            <a:ext cx="9144000" cy="5144400"/>
-          </a:xfrm>
-          <a:prstGeom prst="rect">
-            <a:avLst/>
-          </a:prstGeom>
-        </p:spPr>
-      </p:pic>
-      <p:sp>
-        <p:nvSpPr>
-          <p:cNvPr id="3" name="TextBox 2"/>
-          <p:cNvSpPr txBox="1"/>
-          <p:nvPr/>
-        </p:nvSpPr>
-        <p:spPr>
-          <a:xfrm>
-            <a:off x="968400" y="550800"/>
-            <a:ext cx="6958799" cy="399600"/>
-          </a:xfrm>
-          <a:prstGeom prst="rect">
-            <a:avLst/>
-          </a:prstGeom>
-          <a:noFill/>
-        </p:spPr>
-        <p:txBody>
-          <a:bodyPr wrap="none" anchor="t">
-            <a:spAutoFit/>
-          </a:bodyPr>
-          <a:lstStyle/>
-          <a:p>
-            <a:pPr>
-              <a:defRPr b="1" sz="2000">
-                <a:solidFill>
-                  <a:srgbClr val="000000"/>
-                </a:solidFill>
-                <a:latin typeface="Calibri"/>
-              </a:defRPr>
-            </a:pPr>
-          </a:p>
-        </p:txBody>
-      </p:sp>
-      <p:sp>
-        <p:nvSpPr>
-          <p:cNvPr id="4" name="TextBox 3"/>
-          <p:cNvSpPr txBox="1"/>
-          <p:nvPr/>
-        </p:nvSpPr>
-        <p:spPr>
-          <a:xfrm>
-            <a:off x="4208400" y="1353600"/>
-            <a:ext cx="4287600" cy="3056400"/>
-          </a:xfrm>
-          <a:prstGeom prst="rect">
-            <a:avLst/>
-          </a:prstGeom>
-          <a:noFill/>
-        </p:spPr>
-        <p:txBody>
-          <a:bodyPr wrap="square" anchor="t">
-            <a:spAutoFit/>
-          </a:bodyPr>
-          <a:lstStyle/>
-          <a:p>
-            <a:pPr>
-              <a:defRPr sz="1200">
-                <a:solidFill>
-                  <a:srgbClr val="000000"/>
-                </a:solidFill>
-                <a:latin typeface="Calibri"/>
-              </a:defRPr>
-            </a:pPr>
-            <a:r>
-              <a:t>- **Scaled Dot-Product Attention**: A key component of the Transformer, enabling the model to weigh the influence of different parts of the input data.</a:t>
+              <a:t>- The Transformer revolutionizes sequence transduction with a unique attention-based architecture, eschewing recurrent layers.</a:t>
+            </a:r>
+            <a:br/>
+            <a:br/>
+            <a:r>
+              <a:t>- Scaled Dot-Product Attention streamlines computational efficiency, enabling nuanced language processing.</a:t>
+            </a:r>
+            <a:br/>
+            <a:br/>
+            <a:r>
+              <a:t>- Multi-Head Attention leverages parallelism, accelerating complex task processing.</a:t>
+            </a:r>
+            <a:br/>
+            <a:br/>
+            <a:r>
+              <a:t>- Self-Attention enhances interpretability and performance, marking a paradigm shift in model design.</a:t>
             </a:r>
           </a:p>
         </p:txBody>

</xml_diff>